<commit_message>
update Users' Guide to FSindo
</commit_message>
<xml_diff>
--- a/doc/FSindo/install_FSindo.pptx
+++ b/doc/FSindo/install_FSindo.pptx
@@ -213,7 +213,7 @@
           <a:p>
             <a:fld id="{BB0F0136-69B4-D44B-9FED-4928016A3512}" type="datetimeFigureOut">
               <a:rPr kumimoji="1" lang="ja-JP" altLang="en-US" smtClean="0"/>
-              <a:t>2019/5/3</a:t>
+              <a:t>2019/11/13</a:t>
             </a:fld>
             <a:endParaRPr kumimoji="1" lang="ja-JP" altLang="en-US"/>
           </a:p>
@@ -727,7 +727,7 @@
           <a:p>
             <a:fld id="{8F1A2EAE-8A19-6140-AB90-FBA793328AFC}" type="datetime1">
               <a:rPr kumimoji="1" lang="ja-JP" altLang="en-US" smtClean="0"/>
-              <a:t>2019/5/3</a:t>
+              <a:t>2019/11/13</a:t>
             </a:fld>
             <a:endParaRPr kumimoji="1" lang="ja-JP" altLang="en-US"/>
           </a:p>
@@ -924,7 +924,7 @@
           <a:p>
             <a:fld id="{5032F6CD-D8C5-EA47-935C-33C61990A9AF}" type="datetime1">
               <a:rPr kumimoji="1" lang="ja-JP" altLang="en-US" smtClean="0"/>
-              <a:t>2019/5/3</a:t>
+              <a:t>2019/11/13</a:t>
             </a:fld>
             <a:endParaRPr kumimoji="1" lang="ja-JP" altLang="en-US"/>
           </a:p>
@@ -1131,7 +1131,7 @@
           <a:p>
             <a:fld id="{7432CAB7-B1D1-C842-BB27-1789136EF085}" type="datetime1">
               <a:rPr kumimoji="1" lang="ja-JP" altLang="en-US" smtClean="0"/>
-              <a:t>2019/5/3</a:t>
+              <a:t>2019/11/13</a:t>
             </a:fld>
             <a:endParaRPr kumimoji="1" lang="ja-JP" altLang="en-US"/>
           </a:p>
@@ -1328,7 +1328,7 @@
           <a:p>
             <a:fld id="{59F606A1-BF80-4F40-AD73-3A1303D72015}" type="datetime1">
               <a:rPr kumimoji="1" lang="ja-JP" altLang="en-US" smtClean="0"/>
-              <a:t>2019/5/3</a:t>
+              <a:t>2019/11/13</a:t>
             </a:fld>
             <a:endParaRPr kumimoji="1" lang="ja-JP" altLang="en-US"/>
           </a:p>
@@ -1567,7 +1567,7 @@
           <a:p>
             <a:fld id="{201370A8-86D7-DE4D-BAB6-D17D5C3BEC5A}" type="datetime1">
               <a:rPr kumimoji="1" lang="ja-JP" altLang="en-US" smtClean="0"/>
-              <a:t>2019/5/3</a:t>
+              <a:t>2019/11/13</a:t>
             </a:fld>
             <a:endParaRPr kumimoji="1" lang="ja-JP" altLang="en-US"/>
           </a:p>
@@ -1858,7 +1858,7 @@
           <a:p>
             <a:fld id="{2F8DFF1A-26F6-734D-81A6-596D27E77CDE}" type="datetime1">
               <a:rPr kumimoji="1" lang="ja-JP" altLang="en-US" smtClean="0"/>
-              <a:t>2019/5/3</a:t>
+              <a:t>2019/11/13</a:t>
             </a:fld>
             <a:endParaRPr kumimoji="1" lang="ja-JP" altLang="en-US"/>
           </a:p>
@@ -2284,7 +2284,7 @@
           <a:p>
             <a:fld id="{DA4D6ED2-2E77-3346-9932-196F8E0DDE9D}" type="datetime1">
               <a:rPr kumimoji="1" lang="ja-JP" altLang="en-US" smtClean="0"/>
-              <a:t>2019/5/3</a:t>
+              <a:t>2019/11/13</a:t>
             </a:fld>
             <a:endParaRPr kumimoji="1" lang="ja-JP" altLang="en-US"/>
           </a:p>
@@ -2397,7 +2397,7 @@
           <a:p>
             <a:fld id="{E0D62E53-0DE6-954C-A642-97CC889F03F2}" type="datetime1">
               <a:rPr kumimoji="1" lang="ja-JP" altLang="en-US" smtClean="0"/>
-              <a:t>2019/5/3</a:t>
+              <a:t>2019/11/13</a:t>
             </a:fld>
             <a:endParaRPr kumimoji="1" lang="ja-JP" altLang="en-US"/>
           </a:p>
@@ -2487,7 +2487,7 @@
           <a:p>
             <a:fld id="{4C76B436-8A19-1A40-8CF4-6DE75F461D19}" type="datetime1">
               <a:rPr kumimoji="1" lang="ja-JP" altLang="en-US" smtClean="0"/>
-              <a:t>2019/5/3</a:t>
+              <a:t>2019/11/13</a:t>
             </a:fld>
             <a:endParaRPr kumimoji="1" lang="ja-JP" altLang="en-US"/>
           </a:p>
@@ -2791,7 +2791,7 @@
           <a:p>
             <a:fld id="{50F977A8-A6EB-6544-A402-5123A38A5E0F}" type="datetime1">
               <a:rPr kumimoji="1" lang="ja-JP" altLang="en-US" smtClean="0"/>
-              <a:t>2019/5/3</a:t>
+              <a:t>2019/11/13</a:t>
             </a:fld>
             <a:endParaRPr kumimoji="1" lang="ja-JP" altLang="en-US"/>
           </a:p>
@@ -3043,7 +3043,7 @@
           <a:p>
             <a:fld id="{AC63A33F-D5AB-5D4B-9CED-7FFE32473911}" type="datetime1">
               <a:rPr kumimoji="1" lang="ja-JP" altLang="en-US" smtClean="0"/>
-              <a:t>2019/5/3</a:t>
+              <a:t>2019/11/13</a:t>
             </a:fld>
             <a:endParaRPr kumimoji="1" lang="ja-JP" altLang="en-US"/>
           </a:p>
@@ -3283,7 +3283,7 @@
           <a:p>
             <a:fld id="{533D1301-D078-CF4D-9B69-E985276E2D1F}" type="datetime1">
               <a:rPr kumimoji="1" lang="ja-JP" altLang="en-US" smtClean="0"/>
-              <a:t>2019/5/3</a:t>
+              <a:t>2019/11/13</a:t>
             </a:fld>
             <a:endParaRPr kumimoji="1" lang="ja-JP" altLang="en-US"/>
           </a:p>
@@ -3767,7 +3767,7 @@
             <a:pPr algn="ctr"/>
             <a:r>
               <a:rPr kumimoji="1" lang="en-US" altLang="ja-JP" dirty="0"/>
-              <a:t>2019/5/14</a:t>
+              <a:t>2019/11/12</a:t>
             </a:r>
             <a:endParaRPr kumimoji="1" lang="ja-JP" altLang="en-US" dirty="0"/>
           </a:p>
@@ -4117,7 +4117,7 @@
         <p:spPr>
           <a:xfrm>
             <a:off x="1394419" y="1711889"/>
-            <a:ext cx="7284110" cy="369332"/>
+            <a:ext cx="4828053" cy="369332"/>
           </a:xfrm>
           <a:prstGeom prst="rect">
             <a:avLst/>
@@ -4132,19 +4132,11 @@
           <a:p>
             <a:r>
               <a:rPr lang="en-US" altLang="ja-JP" dirty="0"/>
-              <a:t>http://</a:t>
+              <a:t>https://</a:t>
             </a:r>
             <a:r>
               <a:rPr lang="en-US" altLang="ja-JP" dirty="0" err="1"/>
-              <a:t>www.riken.jp</a:t>
-            </a:r>
-            <a:r>
-              <a:rPr lang="en-US" altLang="ja-JP" dirty="0"/>
-              <a:t>/TMS2012/</a:t>
-            </a:r>
-            <a:r>
-              <a:rPr lang="en-US" altLang="ja-JP" dirty="0" err="1"/>
-              <a:t>tms</a:t>
+              <a:t>tms.riken.jp</a:t>
             </a:r>
             <a:r>
               <a:rPr lang="en-US" altLang="ja-JP" dirty="0"/>
@@ -4165,10 +4157,6 @@
             <a:r>
               <a:rPr lang="en-US" altLang="ja-JP" dirty="0"/>
               <a:t>/</a:t>
-            </a:r>
-            <a:r>
-              <a:rPr lang="en-US" altLang="ja-JP" dirty="0" err="1"/>
-              <a:t>index.html</a:t>
             </a:r>
             <a:endParaRPr kumimoji="1" lang="ja-JP" altLang="en-US" dirty="0"/>
           </a:p>
@@ -4283,23 +4271,7 @@
                 <a:ea typeface="Courier" charset="0"/>
                 <a:cs typeface="Courier" charset="0"/>
               </a:rPr>
-              <a:t>&gt; cd </a:t>
-            </a:r>
-            <a:r>
-              <a:rPr kumimoji="1" lang="en-US" altLang="ja-JP" sz="1400" dirty="0" err="1">
-                <a:latin typeface="Courier" charset="0"/>
-                <a:ea typeface="Courier" charset="0"/>
-                <a:cs typeface="Courier" charset="0"/>
-              </a:rPr>
-              <a:t>sindo</a:t>
-            </a:r>
-            <a:r>
-              <a:rPr kumimoji="1" lang="en-US" altLang="ja-JP" sz="1400" dirty="0">
-                <a:latin typeface="Courier" charset="0"/>
-                <a:ea typeface="Courier" charset="0"/>
-                <a:cs typeface="Courier" charset="0"/>
-              </a:rPr>
-              <a:t>/</a:t>
+              <a:t>&gt; cd sindo-4.0/</a:t>
             </a:r>
             <a:r>
               <a:rPr kumimoji="1" lang="en-US" altLang="ja-JP" sz="1400" dirty="0" err="1">
@@ -4505,7 +4477,7 @@
         <p:spPr>
           <a:xfrm>
             <a:off x="877584" y="5058289"/>
-            <a:ext cx="2359044" cy="369332"/>
+            <a:ext cx="1354730" cy="369332"/>
           </a:xfrm>
           <a:prstGeom prst="rect">
             <a:avLst/>
@@ -4520,7 +4492,7 @@
           <a:p>
             <a:r>
               <a:rPr lang="en-US" altLang="ja-JP" dirty="0"/>
-              <a:t>4. (Optional) Set a path</a:t>
+              <a:t>4. Set a path</a:t>
             </a:r>
             <a:endParaRPr kumimoji="1" lang="ja-JP" altLang="en-US" dirty="0"/>
           </a:p>
@@ -4535,7 +4507,7 @@
         <p:spPr>
           <a:xfrm>
             <a:off x="1427150" y="5442841"/>
-            <a:ext cx="2977097" cy="523220"/>
+            <a:ext cx="5447325" cy="307777"/>
           </a:xfrm>
           <a:prstGeom prst="rect">
             <a:avLst/>
@@ -4559,39 +4531,104 @@
                 <a:ea typeface="Courier" charset="0"/>
                 <a:cs typeface="Courier" charset="0"/>
               </a:rPr>
-              <a:t>&gt; cd ../bin</a:t>
-            </a:r>
-            <a:endParaRPr lang="en-US" altLang="ja-JP" sz="1400" dirty="0">
+              <a:t>&gt; </a:t>
+            </a:r>
+            <a:r>
+              <a:rPr lang="en-US" altLang="ja-JP" sz="1400" dirty="0">
+                <a:latin typeface="Courier" charset="0"/>
+                <a:ea typeface="Courier" charset="0"/>
+                <a:cs typeface="Courier" charset="0"/>
+              </a:rPr>
+              <a:t>export PATH=$PATH:/</a:t>
+            </a:r>
+            <a:r>
+              <a:rPr lang="en-US" altLang="ja-JP" sz="1400" dirty="0">
+                <a:solidFill>
+                  <a:srgbClr val="FF0000"/>
+                </a:solidFill>
+                <a:latin typeface="Courier" charset="0"/>
+                <a:ea typeface="Courier" charset="0"/>
+                <a:cs typeface="Courier" charset="0"/>
+              </a:rPr>
+              <a:t>path/to</a:t>
+            </a:r>
+            <a:r>
+              <a:rPr lang="en-US" altLang="ja-JP" sz="1400" dirty="0">
+                <a:latin typeface="Courier" charset="0"/>
+                <a:ea typeface="Courier" charset="0"/>
+                <a:cs typeface="Courier" charset="0"/>
+              </a:rPr>
+              <a:t>/sindo-4.0/</a:t>
+            </a:r>
+            <a:r>
+              <a:rPr lang="en-US" altLang="ja-JP" sz="1400">
+                <a:latin typeface="Courier" charset="0"/>
+                <a:ea typeface="Courier" charset="0"/>
+                <a:cs typeface="Courier" charset="0"/>
+              </a:rPr>
+              <a:t>FSindo</a:t>
+            </a:r>
+            <a:r>
+              <a:rPr lang="en-US" altLang="ja-JP" sz="1400" dirty="0">
+                <a:latin typeface="Courier" charset="0"/>
+                <a:ea typeface="Courier" charset="0"/>
+                <a:cs typeface="Courier" charset="0"/>
+              </a:rPr>
+              <a:t>/bin</a:t>
+            </a:r>
+            <a:endParaRPr kumimoji="1" lang="en-US" altLang="ja-JP" sz="1400" dirty="0">
               <a:latin typeface="Courier" charset="0"/>
               <a:ea typeface="Courier" charset="0"/>
               <a:cs typeface="Courier" charset="0"/>
             </a:endParaRPr>
           </a:p>
-          <a:p>
-            <a:r>
-              <a:rPr kumimoji="1" lang="en-US" altLang="ja-JP" sz="1400" dirty="0">
-                <a:latin typeface="Courier" charset="0"/>
-                <a:ea typeface="Courier" charset="0"/>
-                <a:cs typeface="Courier" charset="0"/>
-              </a:rPr>
-              <a:t>&gt; export PATH=$(</a:t>
-            </a:r>
-            <a:r>
-              <a:rPr kumimoji="1" lang="en-US" altLang="ja-JP" sz="1400" dirty="0" err="1">
-                <a:latin typeface="Courier" charset="0"/>
-                <a:ea typeface="Courier" charset="0"/>
-                <a:cs typeface="Courier" charset="0"/>
-              </a:rPr>
-              <a:t>pwd</a:t>
-            </a:r>
-            <a:r>
-              <a:rPr kumimoji="1" lang="en-US" altLang="ja-JP" sz="1400" dirty="0">
-                <a:latin typeface="Courier" charset="0"/>
-                <a:ea typeface="Courier" charset="0"/>
-                <a:cs typeface="Courier" charset="0"/>
-              </a:rPr>
-              <a:t>):$PATH</a:t>
-            </a:r>
+        </p:txBody>
+      </p:sp>
+      <p:sp>
+        <p:nvSpPr>
+          <p:cNvPr id="15" name="テキスト ボックス 14">
+            <a:extLst>
+              <a:ext uri="{FF2B5EF4-FFF2-40B4-BE49-F238E27FC236}">
+                <a16:creationId xmlns:a16="http://schemas.microsoft.com/office/drawing/2014/main" id="{6CCAECA0-E90A-104A-975E-94B2E139B46B}"/>
+              </a:ext>
+            </a:extLst>
+          </p:cNvPr>
+          <p:cNvSpPr txBox="1"/>
+          <p:nvPr/>
+        </p:nvSpPr>
+        <p:spPr>
+          <a:xfrm>
+            <a:off x="1380768" y="5877272"/>
+            <a:ext cx="6676058" cy="369332"/>
+          </a:xfrm>
+          <a:prstGeom prst="rect">
+            <a:avLst/>
+          </a:prstGeom>
+          <a:noFill/>
+        </p:spPr>
+        <p:txBody>
+          <a:bodyPr wrap="none" rtlCol="0">
+            <a:spAutoFit/>
+          </a:bodyPr>
+          <a:lstStyle/>
+          <a:p>
+            <a:pPr marL="285750" indent="-285750">
+              <a:buFont typeface="Arial" charset="0"/>
+              <a:buChar char="•"/>
+            </a:pPr>
+            <a:r>
+              <a:rPr lang="en-US" altLang="ja-JP" dirty="0"/>
+              <a:t>It is recommended to write this line in your login script (~/.</a:t>
+            </a:r>
+            <a:r>
+              <a:rPr lang="en-US" altLang="ja-JP" dirty="0" err="1"/>
+              <a:t>bashrc</a:t>
+            </a:r>
+            <a:r>
+              <a:rPr lang="en-US" altLang="ja-JP" dirty="0"/>
+              <a:t>).</a:t>
+            </a:r>
+            <a:endParaRPr kumimoji="1" lang="ja-JP" altLang="en-US" dirty="0"/>
           </a:p>
         </p:txBody>
       </p:sp>

</xml_diff>

<commit_message>
update document of FSindo
</commit_message>
<xml_diff>
--- a/doc/FSindo/install_FSindo.pptx
+++ b/doc/FSindo/install_FSindo.pptx
@@ -213,7 +213,7 @@
           <a:p>
             <a:fld id="{BB0F0136-69B4-D44B-9FED-4928016A3512}" type="datetimeFigureOut">
               <a:rPr kumimoji="1" lang="ja-JP" altLang="en-US" smtClean="0"/>
-              <a:t>2019/11/13</a:t>
+              <a:t>2022/3/12</a:t>
             </a:fld>
             <a:endParaRPr kumimoji="1" lang="ja-JP" altLang="en-US"/>
           </a:p>
@@ -727,7 +727,7 @@
           <a:p>
             <a:fld id="{8F1A2EAE-8A19-6140-AB90-FBA793328AFC}" type="datetime1">
               <a:rPr kumimoji="1" lang="ja-JP" altLang="en-US" smtClean="0"/>
-              <a:t>2019/11/13</a:t>
+              <a:t>2022/3/12</a:t>
             </a:fld>
             <a:endParaRPr kumimoji="1" lang="ja-JP" altLang="en-US"/>
           </a:p>
@@ -924,7 +924,7 @@
           <a:p>
             <a:fld id="{5032F6CD-D8C5-EA47-935C-33C61990A9AF}" type="datetime1">
               <a:rPr kumimoji="1" lang="ja-JP" altLang="en-US" smtClean="0"/>
-              <a:t>2019/11/13</a:t>
+              <a:t>2022/3/12</a:t>
             </a:fld>
             <a:endParaRPr kumimoji="1" lang="ja-JP" altLang="en-US"/>
           </a:p>
@@ -1131,7 +1131,7 @@
           <a:p>
             <a:fld id="{7432CAB7-B1D1-C842-BB27-1789136EF085}" type="datetime1">
               <a:rPr kumimoji="1" lang="ja-JP" altLang="en-US" smtClean="0"/>
-              <a:t>2019/11/13</a:t>
+              <a:t>2022/3/12</a:t>
             </a:fld>
             <a:endParaRPr kumimoji="1" lang="ja-JP" altLang="en-US"/>
           </a:p>
@@ -1328,7 +1328,7 @@
           <a:p>
             <a:fld id="{59F606A1-BF80-4F40-AD73-3A1303D72015}" type="datetime1">
               <a:rPr kumimoji="1" lang="ja-JP" altLang="en-US" smtClean="0"/>
-              <a:t>2019/11/13</a:t>
+              <a:t>2022/3/12</a:t>
             </a:fld>
             <a:endParaRPr kumimoji="1" lang="ja-JP" altLang="en-US"/>
           </a:p>
@@ -1567,7 +1567,7 @@
           <a:p>
             <a:fld id="{201370A8-86D7-DE4D-BAB6-D17D5C3BEC5A}" type="datetime1">
               <a:rPr kumimoji="1" lang="ja-JP" altLang="en-US" smtClean="0"/>
-              <a:t>2019/11/13</a:t>
+              <a:t>2022/3/12</a:t>
             </a:fld>
             <a:endParaRPr kumimoji="1" lang="ja-JP" altLang="en-US"/>
           </a:p>
@@ -1858,7 +1858,7 @@
           <a:p>
             <a:fld id="{2F8DFF1A-26F6-734D-81A6-596D27E77CDE}" type="datetime1">
               <a:rPr kumimoji="1" lang="ja-JP" altLang="en-US" smtClean="0"/>
-              <a:t>2019/11/13</a:t>
+              <a:t>2022/3/12</a:t>
             </a:fld>
             <a:endParaRPr kumimoji="1" lang="ja-JP" altLang="en-US"/>
           </a:p>
@@ -2284,7 +2284,7 @@
           <a:p>
             <a:fld id="{DA4D6ED2-2E77-3346-9932-196F8E0DDE9D}" type="datetime1">
               <a:rPr kumimoji="1" lang="ja-JP" altLang="en-US" smtClean="0"/>
-              <a:t>2019/11/13</a:t>
+              <a:t>2022/3/12</a:t>
             </a:fld>
             <a:endParaRPr kumimoji="1" lang="ja-JP" altLang="en-US"/>
           </a:p>
@@ -2397,7 +2397,7 @@
           <a:p>
             <a:fld id="{E0D62E53-0DE6-954C-A642-97CC889F03F2}" type="datetime1">
               <a:rPr kumimoji="1" lang="ja-JP" altLang="en-US" smtClean="0"/>
-              <a:t>2019/11/13</a:t>
+              <a:t>2022/3/12</a:t>
             </a:fld>
             <a:endParaRPr kumimoji="1" lang="ja-JP" altLang="en-US"/>
           </a:p>
@@ -2487,7 +2487,7 @@
           <a:p>
             <a:fld id="{4C76B436-8A19-1A40-8CF4-6DE75F461D19}" type="datetime1">
               <a:rPr kumimoji="1" lang="ja-JP" altLang="en-US" smtClean="0"/>
-              <a:t>2019/11/13</a:t>
+              <a:t>2022/3/12</a:t>
             </a:fld>
             <a:endParaRPr kumimoji="1" lang="ja-JP" altLang="en-US"/>
           </a:p>
@@ -2791,7 +2791,7 @@
           <a:p>
             <a:fld id="{50F977A8-A6EB-6544-A402-5123A38A5E0F}" type="datetime1">
               <a:rPr kumimoji="1" lang="ja-JP" altLang="en-US" smtClean="0"/>
-              <a:t>2019/11/13</a:t>
+              <a:t>2022/3/12</a:t>
             </a:fld>
             <a:endParaRPr kumimoji="1" lang="ja-JP" altLang="en-US"/>
           </a:p>
@@ -3043,7 +3043,7 @@
           <a:p>
             <a:fld id="{AC63A33F-D5AB-5D4B-9CED-7FFE32473911}" type="datetime1">
               <a:rPr kumimoji="1" lang="ja-JP" altLang="en-US" smtClean="0"/>
-              <a:t>2019/11/13</a:t>
+              <a:t>2022/3/12</a:t>
             </a:fld>
             <a:endParaRPr kumimoji="1" lang="ja-JP" altLang="en-US"/>
           </a:p>
@@ -3283,7 +3283,7 @@
           <a:p>
             <a:fld id="{533D1301-D078-CF4D-9B69-E985276E2D1F}" type="datetime1">
               <a:rPr kumimoji="1" lang="ja-JP" altLang="en-US" smtClean="0"/>
-              <a:t>2019/11/13</a:t>
+              <a:t>2022/3/12</a:t>
             </a:fld>
             <a:endParaRPr kumimoji="1" lang="ja-JP" altLang="en-US"/>
           </a:p>
@@ -3767,7 +3767,7 @@
             <a:pPr algn="ctr"/>
             <a:r>
               <a:rPr kumimoji="1" lang="en-US" altLang="ja-JP" dirty="0"/>
-              <a:t>2019/11/12</a:t>
+              <a:t>2022/03/05</a:t>
             </a:r>
             <a:endParaRPr kumimoji="1" lang="ja-JP" altLang="en-US" dirty="0"/>
           </a:p>
@@ -3885,7 +3885,7 @@
         <p:spPr>
           <a:xfrm>
             <a:off x="537029" y="827313"/>
-            <a:ext cx="7864022" cy="1477328"/>
+            <a:ext cx="7864022" cy="2308324"/>
           </a:xfrm>
           <a:prstGeom prst="rect">
             <a:avLst/>
@@ -3907,6 +3907,10 @@
             <a:endParaRPr lang="en-US" altLang="ja-JP" dirty="0"/>
           </a:p>
           <a:p>
+            <a:pPr marL="285750" indent="-285750">
+              <a:buFont typeface="Arial" panose="020B0604020202020204" pitchFamily="34" charset="0"/>
+              <a:buChar char="•"/>
+            </a:pPr>
             <a:r>
               <a:rPr kumimoji="1" lang="en-US" altLang="ja-JP" dirty="0" err="1"/>
               <a:t>FSindo</a:t>
@@ -3923,7 +3927,92 @@
               <a:rPr kumimoji="1" lang="en-US" altLang="ja-JP" dirty="0"/>
               <a:t>This manual assumes that you are familiar with the commands in UNIX, and that you are working on Bourne Shell (bash).</a:t>
             </a:r>
-            <a:endParaRPr kumimoji="1" lang="ja-JP" altLang="en-US"/>
+          </a:p>
+          <a:p>
+            <a:pPr marL="285750" indent="-285750">
+              <a:buFont typeface="Arial" panose="020B0604020202020204" pitchFamily="34" charset="0"/>
+              <a:buChar char="•"/>
+            </a:pPr>
+            <a:endParaRPr kumimoji="1" lang="en-US" altLang="ja-JP"/>
+          </a:p>
+          <a:p>
+            <a:pPr marL="285750" indent="-285750">
+              <a:buFont typeface="Arial" panose="020B0604020202020204" pitchFamily="34" charset="0"/>
+              <a:buChar char="•"/>
+            </a:pPr>
+            <a:r>
+              <a:rPr lang="en-US" altLang="ja-JP" dirty="0"/>
+              <a:t>“/path/to/sindo” indicates the absolute path of your installation directory. For example, </a:t>
+            </a:r>
+            <a:endParaRPr lang="ja-JP" altLang="en-US"/>
+          </a:p>
+        </p:txBody>
+      </p:sp>
+      <p:sp>
+        <p:nvSpPr>
+          <p:cNvPr id="4" name="テキスト ボックス 13">
+            <a:extLst>
+              <a:ext uri="{FF2B5EF4-FFF2-40B4-BE49-F238E27FC236}">
+                <a16:creationId xmlns:a16="http://schemas.microsoft.com/office/drawing/2014/main" id="{46669C9E-E44C-164A-943B-EE79E147DA2B}"/>
+              </a:ext>
+            </a:extLst>
+          </p:cNvPr>
+          <p:cNvSpPr txBox="1"/>
+          <p:nvPr/>
+        </p:nvSpPr>
+        <p:spPr>
+          <a:xfrm>
+            <a:off x="1204223" y="3254328"/>
+            <a:ext cx="4740400" cy="276999"/>
+          </a:xfrm>
+          <a:prstGeom prst="rect">
+            <a:avLst/>
+          </a:prstGeom>
+          <a:noFill/>
+          <a:ln>
+            <a:solidFill>
+              <a:srgbClr val="00B050"/>
+            </a:solidFill>
+          </a:ln>
+        </p:spPr>
+        <p:txBody>
+          <a:bodyPr wrap="none" rtlCol="0">
+            <a:spAutoFit/>
+          </a:bodyPr>
+          <a:lstStyle/>
+          <a:p>
+            <a:r>
+              <a:rPr lang="en-US" altLang="ja-JP" sz="1200" dirty="0">
+                <a:latin typeface="Courier" charset="0"/>
+                <a:ea typeface="Courier" charset="0"/>
+                <a:cs typeface="Courier" charset="0"/>
+              </a:rPr>
+              <a:t>/</a:t>
+            </a:r>
+            <a:r>
+              <a:rPr lang="en-US" altLang="ja-JP" sz="1200" dirty="0">
+                <a:solidFill>
+                  <a:srgbClr val="FF0000"/>
+                </a:solidFill>
+                <a:latin typeface="Courier" charset="0"/>
+                <a:ea typeface="Courier" charset="0"/>
+                <a:cs typeface="Courier" charset="0"/>
+              </a:rPr>
+              <a:t>path/to/sindo </a:t>
+            </a:r>
+            <a:r>
+              <a:rPr lang="en-US" altLang="ja-JP" sz="1200" dirty="0">
+                <a:latin typeface="Courier" charset="0"/>
+                <a:ea typeface="Courier" charset="0"/>
+                <a:cs typeface="Courier" charset="0"/>
+              </a:rPr>
+              <a:t>-&gt; /home/yagi/pgm/sindo-4.0_220312</a:t>
+            </a:r>
+            <a:endParaRPr kumimoji="1" lang="ja-JP" altLang="en-US" sz="1200" dirty="0">
+              <a:latin typeface="Courier" charset="0"/>
+              <a:ea typeface="Courier" charset="0"/>
+              <a:cs typeface="Courier" charset="0"/>
+            </a:endParaRPr>
           </a:p>
         </p:txBody>
       </p:sp>
@@ -4083,7 +4172,7 @@
         <p:spPr>
           <a:xfrm>
             <a:off x="877584" y="1354080"/>
-            <a:ext cx="4515660" cy="369332"/>
+            <a:ext cx="7856125" cy="3693319"/>
           </a:xfrm>
           <a:prstGeom prst="rect">
             <a:avLst/>
@@ -4096,59 +4185,101 @@
           </a:bodyPr>
           <a:lstStyle/>
           <a:p>
-            <a:r>
-              <a:rPr kumimoji="1" lang="en-US" altLang="ja-JP" dirty="0"/>
-              <a:t>1. </a:t>
-            </a:r>
+            <a:pPr marL="342900" indent="-342900">
+              <a:buFont typeface="+mj-lt"/>
+              <a:buAutoNum type="arabicPeriod"/>
+            </a:pPr>
             <a:r>
               <a:rPr lang="en-US" altLang="ja-JP" dirty="0"/>
-              <a:t>Download sindo-4.0.tar.gz from our website</a:t>
-            </a:r>
-            <a:endParaRPr kumimoji="1" lang="ja-JP" altLang="en-US" dirty="0"/>
-          </a:p>
-        </p:txBody>
-      </p:sp>
-      <p:sp>
-        <p:nvSpPr>
-          <p:cNvPr id="4" name="テキスト ボックス 3"/>
-          <p:cNvSpPr txBox="1"/>
-          <p:nvPr/>
-        </p:nvSpPr>
-        <p:spPr>
-          <a:xfrm>
-            <a:off x="1394419" y="1711889"/>
-            <a:ext cx="4828053" cy="369332"/>
-          </a:xfrm>
-          <a:prstGeom prst="rect">
-            <a:avLst/>
-          </a:prstGeom>
-          <a:noFill/>
-        </p:spPr>
-        <p:txBody>
-          <a:bodyPr wrap="none" rtlCol="0">
-            <a:spAutoFit/>
-          </a:bodyPr>
-          <a:lstStyle/>
-          <a:p>
+              <a:t>Download sindo-4.0_xxxx.zip from our website</a:t>
+            </a:r>
+          </a:p>
+          <a:p>
+            <a:pPr lvl="1"/>
             <a:r>
               <a:rPr lang="en-US" altLang="ja-JP" dirty="0"/>
-              <a:t>https://</a:t>
+              <a:t>https://tms.riken.jp/en/research/software/sindo</a:t>
+            </a:r>
+          </a:p>
+          <a:p>
+            <a:pPr marL="342900" indent="-342900">
+              <a:buFont typeface="+mj-lt"/>
+              <a:buAutoNum type="arabicPeriod"/>
+            </a:pPr>
+            <a:endParaRPr lang="en-US" altLang="ja-JP" dirty="0"/>
+          </a:p>
+          <a:p>
+            <a:pPr marL="342900" indent="-342900">
+              <a:buFont typeface="+mj-lt"/>
+              <a:buAutoNum type="arabicPeriod"/>
+            </a:pPr>
+            <a:r>
+              <a:rPr lang="en-US" altLang="ja-JP" dirty="0"/>
+              <a:t>Unzip (double click ) the file, and configure</a:t>
+            </a:r>
+            <a:endParaRPr lang="ja-JP" altLang="en-US" dirty="0"/>
+          </a:p>
+          <a:p>
+            <a:pPr marL="342900" indent="-342900">
+              <a:buFont typeface="+mj-lt"/>
+              <a:buAutoNum type="arabicPeriod"/>
+            </a:pPr>
+            <a:endParaRPr lang="en-US" altLang="ja-JP" dirty="0"/>
+          </a:p>
+          <a:p>
+            <a:pPr marL="342900" indent="-342900">
+              <a:buFont typeface="+mj-lt"/>
+              <a:buAutoNum type="arabicPeriod"/>
+            </a:pPr>
+            <a:endParaRPr lang="en-US" altLang="ja-JP" dirty="0"/>
+          </a:p>
+          <a:p>
+            <a:pPr marL="342900" indent="-342900">
+              <a:buFont typeface="+mj-lt"/>
+              <a:buAutoNum type="arabicPeriod"/>
+            </a:pPr>
+            <a:endParaRPr lang="en-US" altLang="ja-JP" dirty="0"/>
+          </a:p>
+          <a:p>
+            <a:pPr marL="342900" indent="-342900">
+              <a:buFont typeface="+mj-lt"/>
+              <a:buAutoNum type="arabicPeriod"/>
+            </a:pPr>
+            <a:r>
+              <a:rPr lang="en-US" altLang="ja-JP" dirty="0"/>
+              <a:t>Build</a:t>
+            </a:r>
+          </a:p>
+          <a:p>
+            <a:pPr marL="342900" indent="-342900">
+              <a:buFont typeface="+mj-lt"/>
+              <a:buAutoNum type="arabicPeriod"/>
+            </a:pPr>
+            <a:endParaRPr lang="en-US" altLang="ja-JP" dirty="0"/>
+          </a:p>
+          <a:p>
+            <a:pPr marL="342900" indent="-342900">
+              <a:buFont typeface="+mj-lt"/>
+              <a:buAutoNum type="arabicPeriod"/>
+            </a:pPr>
+            <a:endParaRPr lang="en-US" altLang="ja-JP" dirty="0"/>
+          </a:p>
+          <a:p>
+            <a:pPr marL="800100" lvl="1" indent="-342900">
+              <a:buFont typeface="Arial" panose="020B0604020202020204" pitchFamily="34" charset="0"/>
+              <a:buChar char="•"/>
+            </a:pPr>
+            <a:r>
+              <a:rPr lang="en-US" altLang="ja-JP" dirty="0"/>
+              <a:t>When successful, an executable file will be created in “</a:t>
             </a:r>
             <a:r>
               <a:rPr lang="en-US" altLang="ja-JP" dirty="0" err="1"/>
-              <a:t>tms.riken.jp</a:t>
+              <a:t>FSindo</a:t>
             </a:r>
             <a:r>
               <a:rPr lang="en-US" altLang="ja-JP" dirty="0"/>
-              <a:t>/</a:t>
-            </a:r>
-            <a:r>
-              <a:rPr lang="en-US" altLang="ja-JP" dirty="0" err="1"/>
-              <a:t>en</a:t>
-            </a:r>
-            <a:r>
-              <a:rPr lang="en-US" altLang="ja-JP" dirty="0"/>
-              <a:t>/research/software/</a:t>
+              <a:t>/bin/</a:t>
             </a:r>
             <a:r>
               <a:rPr lang="en-US" altLang="ja-JP" dirty="0" err="1"/>
@@ -4156,51 +4287,25 @@
             </a:r>
             <a:r>
               <a:rPr lang="en-US" altLang="ja-JP" dirty="0"/>
-              <a:t>/</a:t>
-            </a:r>
-            <a:endParaRPr kumimoji="1" lang="ja-JP" altLang="en-US" dirty="0"/>
-          </a:p>
-        </p:txBody>
-      </p:sp>
-      <p:sp>
-        <p:nvSpPr>
-          <p:cNvPr id="8" name="テキスト ボックス 7"/>
-          <p:cNvSpPr txBox="1"/>
-          <p:nvPr/>
-        </p:nvSpPr>
-        <p:spPr>
-          <a:xfrm>
-            <a:off x="877584" y="2222321"/>
-            <a:ext cx="3430619" cy="369332"/>
-          </a:xfrm>
-          <a:prstGeom prst="rect">
-            <a:avLst/>
-          </a:prstGeom>
-          <a:noFill/>
-        </p:spPr>
-        <p:txBody>
-          <a:bodyPr wrap="none" rtlCol="0">
-            <a:spAutoFit/>
-          </a:bodyPr>
-          <a:lstStyle/>
-          <a:p>
+              <a:t>”.</a:t>
+            </a:r>
+          </a:p>
+          <a:p>
+            <a:pPr marL="342900" indent="-342900">
+              <a:buFont typeface="+mj-lt"/>
+              <a:buAutoNum type="arabicPeriod"/>
+            </a:pPr>
+            <a:endParaRPr lang="en-US" altLang="ja-JP" dirty="0"/>
+          </a:p>
+          <a:p>
+            <a:pPr marL="342900" indent="-342900">
+              <a:buFont typeface="+mj-lt"/>
+              <a:buAutoNum type="arabicPeriod"/>
+            </a:pPr>
             <a:r>
               <a:rPr lang="en-US" altLang="ja-JP" dirty="0"/>
-              <a:t>2. </a:t>
-            </a:r>
-            <a:r>
-              <a:rPr kumimoji="1" lang="en-US" altLang="ja-JP" dirty="0"/>
-              <a:t>Extract the </a:t>
-            </a:r>
-            <a:r>
-              <a:rPr kumimoji="1" lang="en-US" altLang="ja-JP" dirty="0" err="1"/>
-              <a:t>tarball</a:t>
-            </a:r>
-            <a:r>
-              <a:rPr kumimoji="1" lang="en-US" altLang="ja-JP" dirty="0"/>
-              <a:t> and configure</a:t>
-            </a:r>
-            <a:endParaRPr kumimoji="1" lang="ja-JP" altLang="en-US" dirty="0"/>
+              <a:t>Edit “sindovars.sh” and set “/path/to/sindo” to the name of install directory.</a:t>
+            </a:r>
           </a:p>
         </p:txBody>
       </p:sp>
@@ -4213,7 +4318,7 @@
         <p:spPr>
           <a:xfrm>
             <a:off x="1427150" y="2593383"/>
-            <a:ext cx="3299301" cy="954107"/>
+            <a:ext cx="2601994" cy="646331"/>
           </a:xfrm>
           <a:prstGeom prst="rect">
             <a:avLst/>
@@ -4232,56 +4337,22 @@
           <a:lstStyle/>
           <a:p>
             <a:r>
-              <a:rPr kumimoji="1" lang="en-US" altLang="ja-JP" sz="1400" dirty="0">
-                <a:latin typeface="Courier" charset="0"/>
-                <a:ea typeface="Courier" charset="0"/>
-                <a:cs typeface="Courier" charset="0"/>
-              </a:rPr>
-              <a:t>&gt; tar –</a:t>
-            </a:r>
-            <a:r>
-              <a:rPr kumimoji="1" lang="en-US" altLang="ja-JP" sz="1400" dirty="0" err="1">
-                <a:latin typeface="Courier" charset="0"/>
-                <a:ea typeface="Courier" charset="0"/>
-                <a:cs typeface="Courier" charset="0"/>
-              </a:rPr>
-              <a:t>zxvf</a:t>
-            </a:r>
-            <a:r>
-              <a:rPr kumimoji="1" lang="en-US" altLang="ja-JP" sz="1400" dirty="0">
-                <a:latin typeface="Courier" charset="0"/>
-                <a:ea typeface="Courier" charset="0"/>
-                <a:cs typeface="Courier" charset="0"/>
-              </a:rPr>
-              <a:t> s</a:t>
-            </a:r>
-            <a:r>
-              <a:rPr lang="en-US" altLang="ja-JP" sz="1400" dirty="0">
-                <a:latin typeface="Courier" charset="0"/>
-                <a:ea typeface="Courier" charset="0"/>
-                <a:cs typeface="Courier" charset="0"/>
-              </a:rPr>
-              <a:t>indo-4.0.tar.gz</a:t>
-            </a:r>
-          </a:p>
-          <a:p>
-            <a:r>
-              <a:rPr kumimoji="1" lang="en-US" altLang="ja-JP" sz="1400" dirty="0">
-                <a:latin typeface="Courier" charset="0"/>
-                <a:ea typeface="Courier" charset="0"/>
-                <a:cs typeface="Courier" charset="0"/>
-              </a:rPr>
-              <a:t>&gt; cd sindo-4.0/</a:t>
-            </a:r>
-            <a:r>
-              <a:rPr kumimoji="1" lang="en-US" altLang="ja-JP" sz="1400" dirty="0" err="1">
+              <a:rPr kumimoji="1" lang="en-US" altLang="ja-JP" sz="1200" dirty="0">
+                <a:latin typeface="Courier" charset="0"/>
+                <a:ea typeface="Courier" charset="0"/>
+                <a:cs typeface="Courier" charset="0"/>
+              </a:rPr>
+              <a:t>&gt; cd sindo-4.0_xxxx/</a:t>
+            </a:r>
+            <a:r>
+              <a:rPr kumimoji="1" lang="en-US" altLang="ja-JP" sz="1200" dirty="0" err="1">
                 <a:latin typeface="Courier" charset="0"/>
                 <a:ea typeface="Courier" charset="0"/>
                 <a:cs typeface="Courier" charset="0"/>
               </a:rPr>
               <a:t>FSindo</a:t>
             </a:r>
-            <a:endParaRPr kumimoji="1" lang="en-US" altLang="ja-JP" sz="1400" dirty="0">
+            <a:endParaRPr kumimoji="1" lang="en-US" altLang="ja-JP" sz="1200" dirty="0">
               <a:latin typeface="Courier" charset="0"/>
               <a:ea typeface="Courier" charset="0"/>
               <a:cs typeface="Courier" charset="0"/>
@@ -4289,7 +4360,7 @@
           </a:p>
           <a:p>
             <a:r>
-              <a:rPr kumimoji="1" lang="en-US" altLang="ja-JP" sz="1400" dirty="0">
+              <a:rPr kumimoji="1" lang="en-US" altLang="ja-JP" sz="1200" dirty="0">
                 <a:latin typeface="Courier" charset="0"/>
                 <a:ea typeface="Courier" charset="0"/>
                 <a:cs typeface="Courier" charset="0"/>
@@ -4299,14 +4370,14 @@
           </a:p>
           <a:p>
             <a:r>
-              <a:rPr kumimoji="1" lang="en-US" altLang="ja-JP" sz="1400" dirty="0">
+              <a:rPr kumimoji="1" lang="en-US" altLang="ja-JP" sz="1200" dirty="0">
                 <a:latin typeface="Courier" charset="0"/>
                 <a:ea typeface="Courier" charset="0"/>
                 <a:cs typeface="Courier" charset="0"/>
               </a:rPr>
               <a:t>(See the next page)</a:t>
             </a:r>
-            <a:endParaRPr kumimoji="1" lang="ja-JP" altLang="en-US" sz="1400" dirty="0">
+            <a:endParaRPr kumimoji="1" lang="ja-JP" altLang="en-US" sz="1200" dirty="0">
               <a:latin typeface="Courier" charset="0"/>
               <a:ea typeface="Courier" charset="0"/>
               <a:cs typeface="Courier" charset="0"/>
@@ -4316,44 +4387,14 @@
       </p:sp>
       <p:sp>
         <p:nvSpPr>
-          <p:cNvPr id="10" name="テキスト ボックス 9"/>
-          <p:cNvSpPr txBox="1"/>
-          <p:nvPr/>
-        </p:nvSpPr>
-        <p:spPr>
-          <a:xfrm>
-            <a:off x="877584" y="3680061"/>
-            <a:ext cx="886781" cy="369332"/>
-          </a:xfrm>
-          <a:prstGeom prst="rect">
-            <a:avLst/>
-          </a:prstGeom>
-          <a:noFill/>
-        </p:spPr>
-        <p:txBody>
-          <a:bodyPr wrap="none" rtlCol="0">
-            <a:spAutoFit/>
-          </a:bodyPr>
-          <a:lstStyle/>
-          <a:p>
-            <a:r>
-              <a:rPr lang="en-US" altLang="ja-JP" dirty="0"/>
-              <a:t>3. Build</a:t>
-            </a:r>
-            <a:endParaRPr kumimoji="1" lang="ja-JP" altLang="en-US" dirty="0"/>
-          </a:p>
-        </p:txBody>
-      </p:sp>
-      <p:sp>
-        <p:nvSpPr>
           <p:cNvPr id="11" name="テキスト ボックス 10"/>
           <p:cNvSpPr txBox="1"/>
           <p:nvPr/>
         </p:nvSpPr>
         <p:spPr>
           <a:xfrm>
-            <a:off x="1427150" y="4051124"/>
-            <a:ext cx="2117887" cy="523220"/>
+            <a:off x="1427150" y="3626580"/>
+            <a:ext cx="1858201" cy="461665"/>
           </a:xfrm>
           <a:prstGeom prst="rect">
             <a:avLst/>
@@ -4372,7 +4413,7 @@
           <a:lstStyle/>
           <a:p>
             <a:r>
-              <a:rPr kumimoji="1" lang="en-US" altLang="ja-JP" sz="1400" dirty="0">
+              <a:rPr kumimoji="1" lang="en-US" altLang="ja-JP" sz="1200" dirty="0">
                 <a:latin typeface="Courier" charset="0"/>
                 <a:ea typeface="Courier" charset="0"/>
                 <a:cs typeface="Courier" charset="0"/>
@@ -4380,14 +4421,14 @@
               <a:t>&gt; cd </a:t>
             </a:r>
             <a:r>
-              <a:rPr kumimoji="1" lang="en-US" altLang="ja-JP" sz="1400" dirty="0" err="1">
+              <a:rPr kumimoji="1" lang="en-US" altLang="ja-JP" sz="1200" dirty="0" err="1">
                 <a:latin typeface="Courier" charset="0"/>
                 <a:ea typeface="Courier" charset="0"/>
                 <a:cs typeface="Courier" charset="0"/>
               </a:rPr>
               <a:t>src</a:t>
             </a:r>
-            <a:endParaRPr lang="en-US" altLang="ja-JP" sz="1400" dirty="0">
+            <a:endParaRPr lang="en-US" altLang="ja-JP" sz="1200" dirty="0">
               <a:latin typeface="Courier" charset="0"/>
               <a:ea typeface="Courier" charset="0"/>
               <a:cs typeface="Courier" charset="0"/>
@@ -4395,7 +4436,7 @@
           </a:p>
           <a:p>
             <a:r>
-              <a:rPr kumimoji="1" lang="en-US" altLang="ja-JP" sz="1400" dirty="0">
+              <a:rPr kumimoji="1" lang="en-US" altLang="ja-JP" sz="1200" dirty="0">
                 <a:latin typeface="Courier" charset="0"/>
                 <a:ea typeface="Courier" charset="0"/>
                 <a:cs typeface="Courier" charset="0"/>
@@ -4403,14 +4444,14 @@
               <a:t>&gt; make &gt;&amp; </a:t>
             </a:r>
             <a:r>
-              <a:rPr kumimoji="1" lang="en-US" altLang="ja-JP" sz="1400" dirty="0" err="1">
+              <a:rPr kumimoji="1" lang="en-US" altLang="ja-JP" sz="1200" dirty="0" err="1">
                 <a:latin typeface="Courier" charset="0"/>
                 <a:ea typeface="Courier" charset="0"/>
                 <a:cs typeface="Courier" charset="0"/>
               </a:rPr>
               <a:t>make.log</a:t>
             </a:r>
-            <a:endParaRPr kumimoji="1" lang="en-US" altLang="ja-JP" sz="1400" dirty="0">
+            <a:endParaRPr kumimoji="1" lang="en-US" altLang="ja-JP" sz="1200" dirty="0">
               <a:latin typeface="Courier" charset="0"/>
               <a:ea typeface="Courier" charset="0"/>
               <a:cs typeface="Courier" charset="0"/>
@@ -4420,94 +4461,20 @@
       </p:sp>
       <p:sp>
         <p:nvSpPr>
-          <p:cNvPr id="12" name="テキスト ボックス 11"/>
+          <p:cNvPr id="16" name="テキスト ボックス 13">
+            <a:extLst>
+              <a:ext uri="{FF2B5EF4-FFF2-40B4-BE49-F238E27FC236}">
+                <a16:creationId xmlns:a16="http://schemas.microsoft.com/office/drawing/2014/main" id="{5905953A-60C6-6345-8F29-08A9C137DA19}"/>
+              </a:ext>
+            </a:extLst>
+          </p:cNvPr>
           <p:cNvSpPr txBox="1"/>
           <p:nvPr/>
         </p:nvSpPr>
         <p:spPr>
           <a:xfrm>
-            <a:off x="1380768" y="4607716"/>
-            <a:ext cx="7389331" cy="369332"/>
-          </a:xfrm>
-          <a:prstGeom prst="rect">
-            <a:avLst/>
-          </a:prstGeom>
-          <a:noFill/>
-        </p:spPr>
-        <p:txBody>
-          <a:bodyPr wrap="none" rtlCol="0">
-            <a:spAutoFit/>
-          </a:bodyPr>
-          <a:lstStyle/>
-          <a:p>
-            <a:pPr marL="285750" indent="-285750">
-              <a:buFont typeface="Arial" charset="0"/>
-              <a:buChar char="•"/>
-            </a:pPr>
-            <a:r>
-              <a:rPr lang="en-US" altLang="ja-JP" dirty="0"/>
-              <a:t>When successful, an executable file will be created in “</a:t>
-            </a:r>
-            <a:r>
-              <a:rPr lang="en-US" altLang="ja-JP" dirty="0" err="1"/>
-              <a:t>FSindo</a:t>
-            </a:r>
-            <a:r>
-              <a:rPr lang="en-US" altLang="ja-JP" dirty="0"/>
-              <a:t>/bin/</a:t>
-            </a:r>
-            <a:r>
-              <a:rPr lang="en-US" altLang="ja-JP" dirty="0" err="1"/>
-              <a:t>sindo</a:t>
-            </a:r>
-            <a:r>
-              <a:rPr lang="en-US" altLang="ja-JP" dirty="0"/>
-              <a:t>”.</a:t>
-            </a:r>
-            <a:endParaRPr kumimoji="1" lang="ja-JP" altLang="en-US" dirty="0"/>
-          </a:p>
-        </p:txBody>
-      </p:sp>
-      <p:sp>
-        <p:nvSpPr>
-          <p:cNvPr id="13" name="テキスト ボックス 12"/>
-          <p:cNvSpPr txBox="1"/>
-          <p:nvPr/>
-        </p:nvSpPr>
-        <p:spPr>
-          <a:xfrm>
-            <a:off x="877584" y="5058289"/>
-            <a:ext cx="1354730" cy="369332"/>
-          </a:xfrm>
-          <a:prstGeom prst="rect">
-            <a:avLst/>
-          </a:prstGeom>
-          <a:noFill/>
-        </p:spPr>
-        <p:txBody>
-          <a:bodyPr wrap="none" rtlCol="0">
-            <a:spAutoFit/>
-          </a:bodyPr>
-          <a:lstStyle/>
-          <a:p>
-            <a:r>
-              <a:rPr lang="en-US" altLang="ja-JP" dirty="0"/>
-              <a:t>4. Set a path</a:t>
-            </a:r>
-            <a:endParaRPr kumimoji="1" lang="ja-JP" altLang="en-US" dirty="0"/>
-          </a:p>
-        </p:txBody>
-      </p:sp>
-      <p:sp>
-        <p:nvSpPr>
-          <p:cNvPr id="14" name="テキスト ボックス 13"/>
-          <p:cNvSpPr txBox="1"/>
-          <p:nvPr/>
-        </p:nvSpPr>
-        <p:spPr>
-          <a:xfrm>
-            <a:off x="1427150" y="5442841"/>
-            <a:ext cx="5447325" cy="307777"/>
+            <a:off x="1443709" y="5072706"/>
+            <a:ext cx="6692858" cy="1200329"/>
           </a:xfrm>
           <a:prstGeom prst="rect">
             <a:avLst/>
@@ -4526,109 +4493,76 @@
           <a:lstStyle/>
           <a:p>
             <a:r>
-              <a:rPr kumimoji="1" lang="en-US" altLang="ja-JP" sz="1400" dirty="0">
-                <a:latin typeface="Courier" charset="0"/>
-                <a:ea typeface="Courier" charset="0"/>
-                <a:cs typeface="Courier" charset="0"/>
-              </a:rPr>
-              <a:t>&gt; </a:t>
-            </a:r>
-            <a:r>
-              <a:rPr lang="en-US" altLang="ja-JP" sz="1400" dirty="0">
-                <a:latin typeface="Courier" charset="0"/>
-                <a:ea typeface="Courier" charset="0"/>
-                <a:cs typeface="Courier" charset="0"/>
-              </a:rPr>
-              <a:t>export PATH=$PATH:/</a:t>
-            </a:r>
-            <a:r>
-              <a:rPr lang="en-US" altLang="ja-JP" sz="1400" dirty="0">
-                <a:solidFill>
-                  <a:srgbClr val="FF0000"/>
-                </a:solidFill>
-                <a:latin typeface="Courier" charset="0"/>
-                <a:ea typeface="Courier" charset="0"/>
-                <a:cs typeface="Courier" charset="0"/>
-              </a:rPr>
-              <a:t>path/to</a:t>
-            </a:r>
-            <a:r>
-              <a:rPr lang="en-US" altLang="ja-JP" sz="1400" dirty="0">
-                <a:latin typeface="Courier" charset="0"/>
-                <a:ea typeface="Courier" charset="0"/>
-                <a:cs typeface="Courier" charset="0"/>
-              </a:rPr>
-              <a:t>/sindo-4.0/</a:t>
-            </a:r>
-            <a:r>
-              <a:rPr lang="en-US" altLang="ja-JP" sz="1400">
-                <a:latin typeface="Courier" charset="0"/>
-                <a:ea typeface="Courier" charset="0"/>
-                <a:cs typeface="Courier" charset="0"/>
-              </a:rPr>
-              <a:t>FSindo</a:t>
-            </a:r>
-            <a:r>
-              <a:rPr lang="en-US" altLang="ja-JP" sz="1400" dirty="0">
-                <a:latin typeface="Courier" charset="0"/>
-                <a:ea typeface="Courier" charset="0"/>
-                <a:cs typeface="Courier" charset="0"/>
-              </a:rPr>
-              <a:t>/bin</a:t>
-            </a:r>
-            <a:endParaRPr kumimoji="1" lang="en-US" altLang="ja-JP" sz="1400" dirty="0">
+              <a:rPr lang="en-US" altLang="ja-JP" sz="1200" dirty="0">
+                <a:latin typeface="Courier" charset="0"/>
+                <a:ea typeface="Courier" charset="0"/>
+                <a:cs typeface="Courier" charset="0"/>
+              </a:rPr>
+              <a:t>#!/bin/bash</a:t>
+            </a:r>
+          </a:p>
+          <a:p>
+            <a:endParaRPr lang="en-US" altLang="ja-JP" sz="1200" dirty="0">
               <a:latin typeface="Courier" charset="0"/>
               <a:ea typeface="Courier" charset="0"/>
               <a:cs typeface="Courier" charset="0"/>
             </a:endParaRPr>
           </a:p>
-        </p:txBody>
-      </p:sp>
-      <p:sp>
-        <p:nvSpPr>
-          <p:cNvPr id="15" name="テキスト ボックス 14">
-            <a:extLst>
-              <a:ext uri="{FF2B5EF4-FFF2-40B4-BE49-F238E27FC236}">
-                <a16:creationId xmlns:a16="http://schemas.microsoft.com/office/drawing/2014/main" id="{6CCAECA0-E90A-104A-975E-94B2E139B46B}"/>
-              </a:ext>
-            </a:extLst>
-          </p:cNvPr>
-          <p:cNvSpPr txBox="1"/>
-          <p:nvPr/>
-        </p:nvSpPr>
-        <p:spPr>
-          <a:xfrm>
-            <a:off x="1380768" y="5877272"/>
-            <a:ext cx="6676058" cy="369332"/>
-          </a:xfrm>
-          <a:prstGeom prst="rect">
-            <a:avLst/>
-          </a:prstGeom>
-          <a:noFill/>
-        </p:spPr>
-        <p:txBody>
-          <a:bodyPr wrap="none" rtlCol="0">
-            <a:spAutoFit/>
-          </a:bodyPr>
-          <a:lstStyle/>
-          <a:p>
-            <a:pPr marL="285750" indent="-285750">
-              <a:buFont typeface="Arial" charset="0"/>
-              <a:buChar char="•"/>
-            </a:pPr>
-            <a:r>
-              <a:rPr lang="en-US" altLang="ja-JP" dirty="0"/>
-              <a:t>It is recommended to write this line in your login script (~/.</a:t>
-            </a:r>
-            <a:r>
-              <a:rPr lang="en-US" altLang="ja-JP" dirty="0" err="1"/>
-              <a:t>bashrc</a:t>
-            </a:r>
-            <a:r>
-              <a:rPr lang="en-US" altLang="ja-JP" dirty="0"/>
-              <a:t>).</a:t>
-            </a:r>
-            <a:endParaRPr kumimoji="1" lang="ja-JP" altLang="en-US" dirty="0"/>
+          <a:p>
+            <a:r>
+              <a:rPr lang="en-US" altLang="ja-JP" sz="1200" dirty="0">
+                <a:latin typeface="Courier" charset="0"/>
+                <a:ea typeface="Courier" charset="0"/>
+                <a:cs typeface="Courier" charset="0"/>
+              </a:rPr>
+              <a:t>export sindo_dir=/</a:t>
+            </a:r>
+            <a:r>
+              <a:rPr lang="en-US" altLang="ja-JP" sz="1200" dirty="0">
+                <a:solidFill>
+                  <a:srgbClr val="FF0000"/>
+                </a:solidFill>
+                <a:latin typeface="Courier" charset="0"/>
+                <a:ea typeface="Courier" charset="0"/>
+                <a:cs typeface="Courier" charset="0"/>
+              </a:rPr>
+              <a:t>path/to/sindo</a:t>
+            </a:r>
+          </a:p>
+          <a:p>
+            <a:r>
+              <a:rPr lang="en-US" altLang="ja-JP" sz="1200" dirty="0">
+                <a:latin typeface="Courier" charset="0"/>
+                <a:ea typeface="Courier" charset="0"/>
+                <a:cs typeface="Courier" charset="0"/>
+              </a:rPr>
+              <a:t>export CLASSPATH=${CLASSPATH}:$sindo_dir/JSindo/jar/JSindo-4.0_fat.jar</a:t>
+            </a:r>
+          </a:p>
+          <a:p>
+            <a:r>
+              <a:rPr lang="en-US" altLang="ja-JP" sz="1200" dirty="0">
+                <a:latin typeface="Courier" charset="0"/>
+                <a:ea typeface="Courier" charset="0"/>
+                <a:cs typeface="Courier" charset="0"/>
+              </a:rPr>
+              <a:t>export PATH=$PATH:$sindo_dir/script:$sindo_dir/FSindo/bin</a:t>
+            </a:r>
+          </a:p>
+          <a:p>
+            <a:r>
+              <a:rPr lang="en-US" altLang="ja-JP" sz="1200" dirty="0">
+                <a:latin typeface="Courier" charset="0"/>
+                <a:ea typeface="Courier" charset="0"/>
+                <a:cs typeface="Courier" charset="0"/>
+              </a:rPr>
+              <a:t>export SINDO_RSH=ssh</a:t>
+            </a:r>
+            <a:endParaRPr kumimoji="1" lang="ja-JP" altLang="en-US" sz="1200" dirty="0">
+              <a:latin typeface="Courier" charset="0"/>
+              <a:ea typeface="Courier" charset="0"/>
+              <a:cs typeface="Courier" charset="0"/>
+            </a:endParaRPr>
           </a:p>
         </p:txBody>
       </p:sp>

</xml_diff>